<commit_message>
small fix of documents
</commit_message>
<xml_diff>
--- a/LifeGameDesignDocument.pptx
+++ b/LifeGameDesignDocument.pptx
@@ -14784,8 +14784,19 @@
                 <a:latin typeface="Times New Roman" pitchFamily="18" charset="0"/>
                 <a:cs typeface="Times New Roman" pitchFamily="18" charset="0"/>
               </a:rPr>
-              <a:t>HTML5, CSS, and Java Script</a:t>
-            </a:r>
+              <a:t>HTML5, CSS, </a:t>
+            </a:r>
+            <a:r>
+              <a:rPr lang="en-US" altLang="ja-JP" sz="2400" smtClean="0">
+                <a:latin typeface="Times New Roman" pitchFamily="18" charset="0"/>
+                <a:cs typeface="Times New Roman" pitchFamily="18" charset="0"/>
+              </a:rPr>
+              <a:t>and JavaScript</a:t>
+            </a:r>
+            <a:endParaRPr lang="en-US" altLang="ja-JP" sz="2400" dirty="0" smtClean="0">
+              <a:latin typeface="Times New Roman" pitchFamily="18" charset="0"/>
+              <a:cs typeface="Times New Roman" pitchFamily="18" charset="0"/>
+            </a:endParaRPr>
           </a:p>
           <a:p>
             <a:pPr lvl="1"/>
@@ -19406,7 +19417,7 @@
         </p:nvSpPr>
         <p:spPr>
           <a:xfrm>
-            <a:off x="7380312" y="2211597"/>
+            <a:off x="5277515" y="2211597"/>
             <a:ext cx="288032" cy="288032"/>
           </a:xfrm>
           <a:prstGeom prst="rect">
@@ -19459,7 +19470,7 @@
         </p:nvSpPr>
         <p:spPr>
           <a:xfrm>
-            <a:off x="6628437" y="2204864"/>
+            <a:off x="5965800" y="2204864"/>
             <a:ext cx="288032" cy="288032"/>
           </a:xfrm>
           <a:prstGeom prst="rect">
@@ -19512,7 +19523,7 @@
         </p:nvSpPr>
         <p:spPr>
           <a:xfrm>
-            <a:off x="6471597" y="2492896"/>
+            <a:off x="5808960" y="2492896"/>
             <a:ext cx="620683" cy="369332"/>
           </a:xfrm>
           <a:prstGeom prst="rect">
@@ -19544,7 +19555,7 @@
         </p:nvSpPr>
         <p:spPr>
           <a:xfrm>
-            <a:off x="7250861" y="2499629"/>
+            <a:off x="5148064" y="2499629"/>
             <a:ext cx="633507" cy="369332"/>
           </a:xfrm>
           <a:prstGeom prst="rect">
@@ -24083,7 +24094,7 @@
             <a:r>
               <a:rPr lang="en-US" altLang="ja-JP" sz="1600" dirty="0" err="1" smtClean="0">
                 <a:solidFill>
-                  <a:schemeClr val="tx1"/>
+                  <a:srgbClr val="0070C0"/>
                 </a:solidFill>
                 <a:latin typeface="Times New Roman" pitchFamily="18" charset="0"/>
                 <a:cs typeface="Times New Roman" pitchFamily="18" charset="0"/>
@@ -24093,7 +24104,7 @@
             <a:r>
               <a:rPr lang="en-US" altLang="ja-JP" sz="1600" dirty="0" smtClean="0">
                 <a:solidFill>
-                  <a:schemeClr val="tx1"/>
+                  <a:srgbClr val="0070C0"/>
                 </a:solidFill>
                 <a:latin typeface="Times New Roman" pitchFamily="18" charset="0"/>
                 <a:cs typeface="Times New Roman" pitchFamily="18" charset="0"/>
@@ -27324,8 +27335,35 @@
                 <a:latin typeface="Times New Roman" pitchFamily="18" charset="0"/>
                 <a:cs typeface="Times New Roman" pitchFamily="18" charset="0"/>
               </a:rPr>
-              <a:t>[][]</a:t>
-            </a:r>
+              <a:t>[H][</a:t>
+            </a:r>
+            <a:r>
+              <a:rPr lang="en-US" altLang="ja-JP" sz="1600" dirty="0" smtClean="0">
+                <a:solidFill>
+                  <a:schemeClr val="tx1"/>
+                </a:solidFill>
+                <a:latin typeface="Times New Roman" pitchFamily="18" charset="0"/>
+                <a:cs typeface="Times New Roman" pitchFamily="18" charset="0"/>
+              </a:rPr>
+              <a:t>W</a:t>
+            </a:r>
+            <a:r>
+              <a:rPr lang="en-US" altLang="ja-JP" sz="1600" dirty="0" smtClean="0">
+                <a:solidFill>
+                  <a:schemeClr val="tx1"/>
+                </a:solidFill>
+                <a:latin typeface="Times New Roman" pitchFamily="18" charset="0"/>
+                <a:cs typeface="Times New Roman" pitchFamily="18" charset="0"/>
+              </a:rPr>
+              <a:t>]</a:t>
+            </a:r>
+            <a:endParaRPr lang="en-US" altLang="ja-JP" sz="1600" dirty="0" smtClean="0">
+              <a:solidFill>
+                <a:schemeClr val="tx1"/>
+              </a:solidFill>
+              <a:latin typeface="Times New Roman" pitchFamily="18" charset="0"/>
+              <a:cs typeface="Times New Roman" pitchFamily="18" charset="0"/>
+            </a:endParaRPr>
           </a:p>
           <a:p>
             <a:r>
@@ -27346,8 +27384,25 @@
                 <a:latin typeface="Times New Roman" pitchFamily="18" charset="0"/>
                 <a:cs typeface="Times New Roman" pitchFamily="18" charset="0"/>
               </a:rPr>
-              <a:t>: live/dead</a:t>
-            </a:r>
+              <a:t>: </a:t>
+            </a:r>
+            <a:r>
+              <a:rPr lang="en-US" altLang="ja-JP" sz="1600" dirty="0" smtClean="0">
+                <a:solidFill>
+                  <a:schemeClr val="tx1"/>
+                </a:solidFill>
+                <a:latin typeface="Times New Roman" pitchFamily="18" charset="0"/>
+                <a:cs typeface="Times New Roman" pitchFamily="18" charset="0"/>
+              </a:rPr>
+              <a:t>alive/dead</a:t>
+            </a:r>
+            <a:endParaRPr lang="en-US" altLang="ja-JP" sz="1600" dirty="0" smtClean="0">
+              <a:solidFill>
+                <a:schemeClr val="tx1"/>
+              </a:solidFill>
+              <a:latin typeface="Times New Roman" pitchFamily="18" charset="0"/>
+              <a:cs typeface="Times New Roman" pitchFamily="18" charset="0"/>
+            </a:endParaRPr>
           </a:p>
           <a:p>
             <a:r>
@@ -27830,10 +27885,8 @@
                 <a:latin typeface="Times New Roman" pitchFamily="18" charset="0"/>
                 <a:cs typeface="Times New Roman" pitchFamily="18" charset="0"/>
               </a:rPr>
-              <a:t>Uint32: live/dead</a:t>
-            </a:r>
-          </a:p>
-          <a:p>
+              <a:t>Uint32: </a:t>
+            </a:r>
             <a:r>
               <a:rPr lang="en-US" altLang="ja-JP" sz="1600" dirty="0" smtClean="0">
                 <a:solidFill>
@@ -27842,8 +27895,15 @@
                 <a:latin typeface="Times New Roman" pitchFamily="18" charset="0"/>
                 <a:cs typeface="Times New Roman" pitchFamily="18" charset="0"/>
               </a:rPr>
-              <a:t>Uint32: age</a:t>
-            </a:r>
+              <a:t>alive/dead</a:t>
+            </a:r>
+            <a:endParaRPr lang="en-US" altLang="ja-JP" sz="1600" dirty="0" smtClean="0">
+              <a:solidFill>
+                <a:schemeClr val="tx1"/>
+              </a:solidFill>
+              <a:latin typeface="Times New Roman" pitchFamily="18" charset="0"/>
+              <a:cs typeface="Times New Roman" pitchFamily="18" charset="0"/>
+            </a:endParaRPr>
           </a:p>
           <a:p>
             <a:r>
@@ -27854,17 +27914,29 @@
                 <a:latin typeface="Times New Roman" pitchFamily="18" charset="0"/>
                 <a:cs typeface="Times New Roman" pitchFamily="18" charset="0"/>
               </a:rPr>
-              <a:t>Uint32: </a:t>
-            </a:r>
-            <a:r>
-              <a:rPr lang="en-US" altLang="ja-JP" sz="1600" dirty="0" err="1" smtClean="0">
+              <a:t>Uint32: age</a:t>
+            </a:r>
+          </a:p>
+          <a:p>
+            <a:r>
+              <a:rPr lang="en-US" altLang="ja-JP" sz="1600" dirty="0" smtClean="0">
                 <a:solidFill>
                   <a:schemeClr val="tx1"/>
                 </a:solidFill>
                 <a:latin typeface="Times New Roman" pitchFamily="18" charset="0"/>
                 <a:cs typeface="Times New Roman" pitchFamily="18" charset="0"/>
               </a:rPr>
-              <a:t>lsex</a:t>
+              <a:t>Uint32: </a:t>
+            </a:r>
+            <a:r>
+              <a:rPr lang="en-US" altLang="ja-JP" sz="1600" dirty="0" smtClean="0">
+                <a:solidFill>
+                  <a:schemeClr val="tx1"/>
+                </a:solidFill>
+                <a:latin typeface="Times New Roman" pitchFamily="18" charset="0"/>
+                <a:cs typeface="Times New Roman" pitchFamily="18" charset="0"/>
+              </a:rPr>
+              <a:t>sex</a:t>
             </a:r>
             <a:endParaRPr lang="en-US" altLang="ja-JP" sz="1600" dirty="0" smtClean="0">
               <a:solidFill>

</xml_diff>

<commit_message>
version 1.0.1 Chrome Web App
</commit_message>
<xml_diff>
--- a/LifeGameDesignDocument.pptx
+++ b/LifeGameDesignDocument.pptx
@@ -207,7 +207,7 @@
             <a:fld id="{38002D3A-5FFE-42F6-815A-3CE01E8CEC86}" type="datetimeFigureOut">
               <a:rPr kumimoji="1" lang="ja-JP" altLang="en-US" smtClean="0"/>
               <a:pPr/>
-              <a:t>2015/8/24</a:t>
+              <a:t>2015/8/25</a:t>
             </a:fld>
             <a:endParaRPr kumimoji="1" lang="ja-JP" altLang="en-US"/>
           </a:p>
@@ -1917,7 +1917,7 @@
             <a:fld id="{E90ED720-0104-4369-84BC-D37694168613}" type="datetimeFigureOut">
               <a:rPr kumimoji="1" lang="ja-JP" altLang="en-US" smtClean="0"/>
               <a:pPr/>
-              <a:t>2015/8/24</a:t>
+              <a:t>2015/8/25</a:t>
             </a:fld>
             <a:endParaRPr kumimoji="1" lang="ja-JP" altLang="en-US"/>
           </a:p>
@@ -2116,7 +2116,7 @@
             <a:fld id="{E90ED720-0104-4369-84BC-D37694168613}" type="datetimeFigureOut">
               <a:rPr kumimoji="1" lang="ja-JP" altLang="en-US" smtClean="0"/>
               <a:pPr/>
-              <a:t>2015/8/24</a:t>
+              <a:t>2015/8/25</a:t>
             </a:fld>
             <a:endParaRPr kumimoji="1" lang="ja-JP" altLang="en-US"/>
           </a:p>
@@ -2325,7 +2325,7 @@
             <a:fld id="{E90ED720-0104-4369-84BC-D37694168613}" type="datetimeFigureOut">
               <a:rPr kumimoji="1" lang="ja-JP" altLang="en-US" smtClean="0"/>
               <a:pPr/>
-              <a:t>2015/8/24</a:t>
+              <a:t>2015/8/25</a:t>
             </a:fld>
             <a:endParaRPr kumimoji="1" lang="ja-JP" altLang="en-US"/>
           </a:p>
@@ -2524,7 +2524,7 @@
             <a:fld id="{E90ED720-0104-4369-84BC-D37694168613}" type="datetimeFigureOut">
               <a:rPr kumimoji="1" lang="ja-JP" altLang="en-US" smtClean="0"/>
               <a:pPr/>
-              <a:t>2015/8/24</a:t>
+              <a:t>2015/8/25</a:t>
             </a:fld>
             <a:endParaRPr kumimoji="1" lang="ja-JP" altLang="en-US"/>
           </a:p>
@@ -2767,7 +2767,7 @@
             <a:fld id="{E90ED720-0104-4369-84BC-D37694168613}" type="datetimeFigureOut">
               <a:rPr kumimoji="1" lang="ja-JP" altLang="en-US" smtClean="0"/>
               <a:pPr/>
-              <a:t>2015/8/24</a:t>
+              <a:t>2015/8/25</a:t>
             </a:fld>
             <a:endParaRPr kumimoji="1" lang="ja-JP" altLang="en-US"/>
           </a:p>
@@ -3116,7 +3116,7 @@
             <a:fld id="{E90ED720-0104-4369-84BC-D37694168613}" type="datetimeFigureOut">
               <a:rPr kumimoji="1" lang="ja-JP" altLang="en-US" smtClean="0"/>
               <a:pPr/>
-              <a:t>2015/8/24</a:t>
+              <a:t>2015/8/25</a:t>
             </a:fld>
             <a:endParaRPr kumimoji="1" lang="ja-JP" altLang="en-US"/>
           </a:p>
@@ -3599,7 +3599,7 @@
             <a:fld id="{E90ED720-0104-4369-84BC-D37694168613}" type="datetimeFigureOut">
               <a:rPr kumimoji="1" lang="ja-JP" altLang="en-US" smtClean="0"/>
               <a:pPr/>
-              <a:t>2015/8/24</a:t>
+              <a:t>2015/8/25</a:t>
             </a:fld>
             <a:endParaRPr kumimoji="1" lang="ja-JP" altLang="en-US"/>
           </a:p>
@@ -3714,7 +3714,7 @@
             <a:fld id="{E90ED720-0104-4369-84BC-D37694168613}" type="datetimeFigureOut">
               <a:rPr kumimoji="1" lang="ja-JP" altLang="en-US" smtClean="0"/>
               <a:pPr/>
-              <a:t>2015/8/24</a:t>
+              <a:t>2015/8/25</a:t>
             </a:fld>
             <a:endParaRPr kumimoji="1" lang="ja-JP" altLang="en-US"/>
           </a:p>
@@ -3806,7 +3806,7 @@
             <a:fld id="{E90ED720-0104-4369-84BC-D37694168613}" type="datetimeFigureOut">
               <a:rPr kumimoji="1" lang="ja-JP" altLang="en-US" smtClean="0"/>
               <a:pPr/>
-              <a:t>2015/8/24</a:t>
+              <a:t>2015/8/25</a:t>
             </a:fld>
             <a:endParaRPr kumimoji="1" lang="ja-JP" altLang="en-US"/>
           </a:p>
@@ -4112,7 +4112,7 @@
             <a:fld id="{E90ED720-0104-4369-84BC-D37694168613}" type="datetimeFigureOut">
               <a:rPr kumimoji="1" lang="ja-JP" altLang="en-US" smtClean="0"/>
               <a:pPr/>
-              <a:t>2015/8/24</a:t>
+              <a:t>2015/8/25</a:t>
             </a:fld>
             <a:endParaRPr kumimoji="1" lang="ja-JP" altLang="en-US"/>
           </a:p>
@@ -4362,7 +4362,7 @@
             <a:fld id="{E90ED720-0104-4369-84BC-D37694168613}" type="datetimeFigureOut">
               <a:rPr kumimoji="1" lang="ja-JP" altLang="en-US" smtClean="0"/>
               <a:pPr/>
-              <a:t>2015/8/24</a:t>
+              <a:t>2015/8/25</a:t>
             </a:fld>
             <a:endParaRPr kumimoji="1" lang="ja-JP" altLang="en-US"/>
           </a:p>
@@ -4604,7 +4604,7 @@
             <a:fld id="{E90ED720-0104-4369-84BC-D37694168613}" type="datetimeFigureOut">
               <a:rPr kumimoji="1" lang="ja-JP" altLang="en-US" smtClean="0"/>
               <a:pPr/>
-              <a:t>2015/8/24</a:t>
+              <a:t>2015/8/25</a:t>
             </a:fld>
             <a:endParaRPr kumimoji="1" lang="ja-JP" altLang="en-US"/>
           </a:p>
@@ -14784,19 +14784,8 @@
                 <a:latin typeface="Times New Roman" pitchFamily="18" charset="0"/>
                 <a:cs typeface="Times New Roman" pitchFamily="18" charset="0"/>
               </a:rPr>
-              <a:t>HTML5, CSS, </a:t>
-            </a:r>
-            <a:r>
-              <a:rPr lang="en-US" altLang="ja-JP" sz="2400" smtClean="0">
-                <a:latin typeface="Times New Roman" pitchFamily="18" charset="0"/>
-                <a:cs typeface="Times New Roman" pitchFamily="18" charset="0"/>
-              </a:rPr>
-              <a:t>and JavaScript</a:t>
-            </a:r>
-            <a:endParaRPr lang="en-US" altLang="ja-JP" sz="2400" dirty="0" smtClean="0">
-              <a:latin typeface="Times New Roman" pitchFamily="18" charset="0"/>
-              <a:cs typeface="Times New Roman" pitchFamily="18" charset="0"/>
-            </a:endParaRPr>
+              <a:t>HTML5, CSS, and JavaScript</a:t>
+            </a:r>
           </a:p>
           <a:p>
             <a:pPr lvl="1"/>
@@ -14825,7 +14814,35 @@
                 <a:latin typeface="Times New Roman" pitchFamily="18" charset="0"/>
                 <a:cs typeface="Times New Roman" pitchFamily="18" charset="0"/>
               </a:rPr>
-              <a:t>do not support Chrome or need special authority (below)</a:t>
+              <a:t>do not support </a:t>
+            </a:r>
+            <a:r>
+              <a:rPr lang="en-US" altLang="ja-JP" sz="1800" dirty="0" smtClean="0">
+                <a:latin typeface="Times New Roman" pitchFamily="18" charset="0"/>
+                <a:cs typeface="Times New Roman" pitchFamily="18" charset="0"/>
+              </a:rPr>
+              <a:t>Chrome (local </a:t>
+            </a:r>
+            <a:r>
+              <a:rPr lang="en-US" altLang="ja-JP" sz="1800" dirty="0" err="1" smtClean="0">
+                <a:latin typeface="Times New Roman" pitchFamily="18" charset="0"/>
+                <a:cs typeface="Times New Roman" pitchFamily="18" charset="0"/>
+              </a:rPr>
+              <a:t>env</a:t>
+            </a:r>
+            <a:r>
+              <a:rPr lang="en-US" altLang="ja-JP" sz="1800" smtClean="0">
+                <a:latin typeface="Times New Roman" pitchFamily="18" charset="0"/>
+                <a:cs typeface="Times New Roman" pitchFamily="18" charset="0"/>
+              </a:rPr>
+              <a:t>.) </a:t>
+            </a:r>
+            <a:r>
+              <a:rPr lang="en-US" altLang="ja-JP" sz="1800" dirty="0" smtClean="0">
+                <a:latin typeface="Times New Roman" pitchFamily="18" charset="0"/>
+                <a:cs typeface="Times New Roman" pitchFamily="18" charset="0"/>
+              </a:rPr>
+              <a:t>or need special authority (below)</a:t>
             </a:r>
           </a:p>
           <a:p>
@@ -27335,7 +27352,19 @@
                 <a:latin typeface="Times New Roman" pitchFamily="18" charset="0"/>
                 <a:cs typeface="Times New Roman" pitchFamily="18" charset="0"/>
               </a:rPr>
-              <a:t>[H][</a:t>
+              <a:t>[H][W]</a:t>
+            </a:r>
+          </a:p>
+          <a:p>
+            <a:r>
+              <a:rPr lang="en-US" altLang="ja-JP" sz="1600" dirty="0" err="1" smtClean="0">
+                <a:solidFill>
+                  <a:schemeClr val="tx1"/>
+                </a:solidFill>
+                <a:latin typeface="Times New Roman" pitchFamily="18" charset="0"/>
+                <a:cs typeface="Times New Roman" pitchFamily="18" charset="0"/>
+              </a:rPr>
+              <a:t>bool</a:t>
             </a:r>
             <a:r>
               <a:rPr lang="en-US" altLang="ja-JP" sz="1600" dirty="0" smtClean="0">
@@ -27345,64 +27374,8 @@
                 <a:latin typeface="Times New Roman" pitchFamily="18" charset="0"/>
                 <a:cs typeface="Times New Roman" pitchFamily="18" charset="0"/>
               </a:rPr>
-              <a:t>W</a:t>
-            </a:r>
-            <a:r>
-              <a:rPr lang="en-US" altLang="ja-JP" sz="1600" dirty="0" smtClean="0">
-                <a:solidFill>
-                  <a:schemeClr val="tx1"/>
-                </a:solidFill>
-                <a:latin typeface="Times New Roman" pitchFamily="18" charset="0"/>
-                <a:cs typeface="Times New Roman" pitchFamily="18" charset="0"/>
-              </a:rPr>
-              <a:t>]</a:t>
-            </a:r>
-            <a:endParaRPr lang="en-US" altLang="ja-JP" sz="1600" dirty="0" smtClean="0">
-              <a:solidFill>
-                <a:schemeClr val="tx1"/>
-              </a:solidFill>
-              <a:latin typeface="Times New Roman" pitchFamily="18" charset="0"/>
-              <a:cs typeface="Times New Roman" pitchFamily="18" charset="0"/>
-            </a:endParaRPr>
-          </a:p>
-          <a:p>
-            <a:r>
-              <a:rPr lang="en-US" altLang="ja-JP" sz="1600" dirty="0" err="1" smtClean="0">
-                <a:solidFill>
-                  <a:schemeClr val="tx1"/>
-                </a:solidFill>
-                <a:latin typeface="Times New Roman" pitchFamily="18" charset="0"/>
-                <a:cs typeface="Times New Roman" pitchFamily="18" charset="0"/>
-              </a:rPr>
-              <a:t>bool</a:t>
-            </a:r>
-            <a:r>
-              <a:rPr lang="en-US" altLang="ja-JP" sz="1600" dirty="0" smtClean="0">
-                <a:solidFill>
-                  <a:schemeClr val="tx1"/>
-                </a:solidFill>
-                <a:latin typeface="Times New Roman" pitchFamily="18" charset="0"/>
-                <a:cs typeface="Times New Roman" pitchFamily="18" charset="0"/>
-              </a:rPr>
-              <a:t>: </a:t>
-            </a:r>
-            <a:r>
-              <a:rPr lang="en-US" altLang="ja-JP" sz="1600" dirty="0" smtClean="0">
-                <a:solidFill>
-                  <a:schemeClr val="tx1"/>
-                </a:solidFill>
-                <a:latin typeface="Times New Roman" pitchFamily="18" charset="0"/>
-                <a:cs typeface="Times New Roman" pitchFamily="18" charset="0"/>
-              </a:rPr>
-              <a:t>alive/dead</a:t>
-            </a:r>
-            <a:endParaRPr lang="en-US" altLang="ja-JP" sz="1600" dirty="0" smtClean="0">
-              <a:solidFill>
-                <a:schemeClr val="tx1"/>
-              </a:solidFill>
-              <a:latin typeface="Times New Roman" pitchFamily="18" charset="0"/>
-              <a:cs typeface="Times New Roman" pitchFamily="18" charset="0"/>
-            </a:endParaRPr>
+              <a:t>: alive/dead</a:t>
+            </a:r>
           </a:p>
           <a:p>
             <a:r>
@@ -27885,8 +27858,10 @@
                 <a:latin typeface="Times New Roman" pitchFamily="18" charset="0"/>
                 <a:cs typeface="Times New Roman" pitchFamily="18" charset="0"/>
               </a:rPr>
-              <a:t>Uint32: </a:t>
-            </a:r>
+              <a:t>Uint32: alive/dead</a:t>
+            </a:r>
+          </a:p>
+          <a:p>
             <a:r>
               <a:rPr lang="en-US" altLang="ja-JP" sz="1600" dirty="0" smtClean="0">
                 <a:solidFill>
@@ -27895,15 +27870,8 @@
                 <a:latin typeface="Times New Roman" pitchFamily="18" charset="0"/>
                 <a:cs typeface="Times New Roman" pitchFamily="18" charset="0"/>
               </a:rPr>
-              <a:t>alive/dead</a:t>
-            </a:r>
-            <a:endParaRPr lang="en-US" altLang="ja-JP" sz="1600" dirty="0" smtClean="0">
-              <a:solidFill>
-                <a:schemeClr val="tx1"/>
-              </a:solidFill>
-              <a:latin typeface="Times New Roman" pitchFamily="18" charset="0"/>
-              <a:cs typeface="Times New Roman" pitchFamily="18" charset="0"/>
-            </a:endParaRPr>
+              <a:t>Uint32: age</a:t>
+            </a:r>
           </a:p>
           <a:p>
             <a:r>
@@ -27914,37 +27882,8 @@
                 <a:latin typeface="Times New Roman" pitchFamily="18" charset="0"/>
                 <a:cs typeface="Times New Roman" pitchFamily="18" charset="0"/>
               </a:rPr>
-              <a:t>Uint32: age</a:t>
-            </a:r>
-          </a:p>
-          <a:p>
-            <a:r>
-              <a:rPr lang="en-US" altLang="ja-JP" sz="1600" dirty="0" smtClean="0">
-                <a:solidFill>
-                  <a:schemeClr val="tx1"/>
-                </a:solidFill>
-                <a:latin typeface="Times New Roman" pitchFamily="18" charset="0"/>
-                <a:cs typeface="Times New Roman" pitchFamily="18" charset="0"/>
-              </a:rPr>
-              <a:t>Uint32: </a:t>
-            </a:r>
-            <a:r>
-              <a:rPr lang="en-US" altLang="ja-JP" sz="1600" dirty="0" smtClean="0">
-                <a:solidFill>
-                  <a:schemeClr val="tx1"/>
-                </a:solidFill>
-                <a:latin typeface="Times New Roman" pitchFamily="18" charset="0"/>
-                <a:cs typeface="Times New Roman" pitchFamily="18" charset="0"/>
-              </a:rPr>
-              <a:t>sex</a:t>
-            </a:r>
-            <a:endParaRPr lang="en-US" altLang="ja-JP" sz="1600" dirty="0" smtClean="0">
-              <a:solidFill>
-                <a:schemeClr val="tx1"/>
-              </a:solidFill>
-              <a:latin typeface="Times New Roman" pitchFamily="18" charset="0"/>
-              <a:cs typeface="Times New Roman" pitchFamily="18" charset="0"/>
-            </a:endParaRPr>
+              <a:t>Uint32: sex</a:t>
+            </a:r>
           </a:p>
           <a:p>
             <a:r>

</xml_diff>